<commit_message>
final push up before second eval
</commit_message>
<xml_diff>
--- a/Non-Technical Presentation.pptx
+++ b/Non-Technical Presentation.pptx
@@ -3154,6 +3154,30 @@
           </pc:sldLayoutMkLst>
         </pc:sldLayoutChg>
       </pc:sldMasterChg>
+    </pc:docChg>
+  </pc:docChgLst>
+  <pc:docChgLst>
+    <pc:chgData name="Michael" userId="0df92e9667c24698" providerId="LiveId" clId="{DBC62A2E-1461-48F6-9577-19E70ECC8B99}"/>
+    <pc:docChg chg="modSld">
+      <pc:chgData name="Michael" userId="0df92e9667c24698" providerId="LiveId" clId="{DBC62A2E-1461-48F6-9577-19E70ECC8B99}" dt="2020-10-15T21:36:25.865" v="0" actId="20577"/>
+      <pc:docMkLst>
+        <pc:docMk/>
+      </pc:docMkLst>
+      <pc:sldChg chg="modSp mod">
+        <pc:chgData name="Michael" userId="0df92e9667c24698" providerId="LiveId" clId="{DBC62A2E-1461-48F6-9577-19E70ECC8B99}" dt="2020-10-15T21:36:25.865" v="0" actId="20577"/>
+        <pc:sldMkLst>
+          <pc:docMk/>
+          <pc:sldMk cId="2791944299" sldId="273"/>
+        </pc:sldMkLst>
+        <pc:spChg chg="mod">
+          <ac:chgData name="Michael" userId="0df92e9667c24698" providerId="LiveId" clId="{DBC62A2E-1461-48F6-9577-19E70ECC8B99}" dt="2020-10-15T21:36:25.865" v="0" actId="20577"/>
+          <ac:spMkLst>
+            <pc:docMk/>
+            <pc:sldMk cId="2791944299" sldId="273"/>
+            <ac:spMk id="18" creationId="{09F46C43-BE08-4116-9F7F-4AFE81116823}"/>
+          </ac:spMkLst>
+        </pc:spChg>
+      </pc:sldChg>
     </pc:docChg>
   </pc:docChgLst>
   <pc:docChgLst>
@@ -8328,7 +8352,7 @@
           <a:p>
             <a:fld id="{C71D86D6-D0D3-4DAE-9F00-F9D2ACB0D6DC}" type="datetimeFigureOut">
               <a:rPr lang="en-US" smtClean="0"/>
-              <a:t>10/14/2020</a:t>
+              <a:t>10/15/2020</a:t>
             </a:fld>
             <a:endParaRPr lang="en-US"/>
           </a:p>
@@ -8526,7 +8550,7 @@
           <a:p>
             <a:fld id="{C71D86D6-D0D3-4DAE-9F00-F9D2ACB0D6DC}" type="datetimeFigureOut">
               <a:rPr lang="en-US" smtClean="0"/>
-              <a:t>10/14/2020</a:t>
+              <a:t>10/15/2020</a:t>
             </a:fld>
             <a:endParaRPr lang="en-US"/>
           </a:p>
@@ -8734,7 +8758,7 @@
           <a:p>
             <a:fld id="{C71D86D6-D0D3-4DAE-9F00-F9D2ACB0D6DC}" type="datetimeFigureOut">
               <a:rPr lang="en-US" smtClean="0"/>
-              <a:t>10/14/2020</a:t>
+              <a:t>10/15/2020</a:t>
             </a:fld>
             <a:endParaRPr lang="en-US"/>
           </a:p>
@@ -8932,7 +8956,7 @@
           <a:p>
             <a:fld id="{C71D86D6-D0D3-4DAE-9F00-F9D2ACB0D6DC}" type="datetimeFigureOut">
               <a:rPr lang="en-US" smtClean="0"/>
-              <a:t>10/14/2020</a:t>
+              <a:t>10/15/2020</a:t>
             </a:fld>
             <a:endParaRPr lang="en-US"/>
           </a:p>
@@ -9207,7 +9231,7 @@
           <a:p>
             <a:fld id="{C71D86D6-D0D3-4DAE-9F00-F9D2ACB0D6DC}" type="datetimeFigureOut">
               <a:rPr lang="en-US" smtClean="0"/>
-              <a:t>10/14/2020</a:t>
+              <a:t>10/15/2020</a:t>
             </a:fld>
             <a:endParaRPr lang="en-US"/>
           </a:p>
@@ -9472,7 +9496,7 @@
           <a:p>
             <a:fld id="{C71D86D6-D0D3-4DAE-9F00-F9D2ACB0D6DC}" type="datetimeFigureOut">
               <a:rPr lang="en-US" smtClean="0"/>
-              <a:t>10/14/2020</a:t>
+              <a:t>10/15/2020</a:t>
             </a:fld>
             <a:endParaRPr lang="en-US"/>
           </a:p>
@@ -9884,7 +9908,7 @@
           <a:p>
             <a:fld id="{C71D86D6-D0D3-4DAE-9F00-F9D2ACB0D6DC}" type="datetimeFigureOut">
               <a:rPr lang="en-US" smtClean="0"/>
-              <a:t>10/14/2020</a:t>
+              <a:t>10/15/2020</a:t>
             </a:fld>
             <a:endParaRPr lang="en-US"/>
           </a:p>
@@ -10025,7 +10049,7 @@
           <a:p>
             <a:fld id="{C71D86D6-D0D3-4DAE-9F00-F9D2ACB0D6DC}" type="datetimeFigureOut">
               <a:rPr lang="en-US" smtClean="0"/>
-              <a:t>10/14/2020</a:t>
+              <a:t>10/15/2020</a:t>
             </a:fld>
             <a:endParaRPr lang="en-US"/>
           </a:p>
@@ -10138,7 +10162,7 @@
           <a:p>
             <a:fld id="{C71D86D6-D0D3-4DAE-9F00-F9D2ACB0D6DC}" type="datetimeFigureOut">
               <a:rPr lang="en-US" smtClean="0"/>
-              <a:t>10/14/2020</a:t>
+              <a:t>10/15/2020</a:t>
             </a:fld>
             <a:endParaRPr lang="en-US"/>
           </a:p>
@@ -10449,7 +10473,7 @@
           <a:p>
             <a:fld id="{C71D86D6-D0D3-4DAE-9F00-F9D2ACB0D6DC}" type="datetimeFigureOut">
               <a:rPr lang="en-US" smtClean="0"/>
-              <a:t>10/14/2020</a:t>
+              <a:t>10/15/2020</a:t>
             </a:fld>
             <a:endParaRPr lang="en-US"/>
           </a:p>
@@ -10737,7 +10761,7 @@
           <a:p>
             <a:fld id="{C71D86D6-D0D3-4DAE-9F00-F9D2ACB0D6DC}" type="datetimeFigureOut">
               <a:rPr lang="en-US" smtClean="0"/>
-              <a:t>10/14/2020</a:t>
+              <a:t>10/15/2020</a:t>
             </a:fld>
             <a:endParaRPr lang="en-US"/>
           </a:p>
@@ -10981,7 +11005,7 @@
           <a:p>
             <a:fld id="{C71D86D6-D0D3-4DAE-9F00-F9D2ACB0D6DC}" type="datetimeFigureOut">
               <a:rPr lang="en-US" smtClean="0"/>
-              <a:t>10/14/2020</a:t>
+              <a:t>10/15/2020</a:t>
             </a:fld>
             <a:endParaRPr lang="en-US"/>
           </a:p>
@@ -20183,7 +20207,7 @@
                   <a:schemeClr val="bg1"/>
                 </a:solidFill>
               </a:rPr>
-              <a:t>The sweet spot appears to be,  115 &gt; populations  &gt; 8. Build wells near populations of this range. </a:t>
+              <a:t>The sweet spot appears to be,  115 &gt; population  &gt; 8. Build wells near populations of this range. </a:t>
             </a:r>
           </a:p>
         </p:txBody>

</xml_diff>